<commit_message>
- Trình bày thứ 7, ngày 31/03
</commit_message>
<xml_diff>
--- a/Presents/Luong.Presents0903.pptx
+++ b/Presents/Luong.Presents0903.pptx
@@ -3832,7 +3832,7 @@
           <a:p>
             <a:fld id="{25F1A227-23B6-4C19-942A-F47326EC29E8}" type="datetimeFigureOut">
               <a:rPr lang="en-US" smtClean="0"/>
-              <a:t>3/9/2012</a:t>
+              <a:t>3/28/2012</a:t>
             </a:fld>
             <a:endParaRPr lang="en-US"/>
           </a:p>
@@ -10051,7 +10051,7 @@
           <a:p>
             <a:fld id="{71052FE1-3B5B-4810-A49E-9809327C23B0}" type="datetime1">
               <a:rPr lang="en-US" smtClean="0"/>
-              <a:t>3/9/2012</a:t>
+              <a:t>3/28/2012</a:t>
             </a:fld>
             <a:endParaRPr lang="en-US"/>
           </a:p>
@@ -10225,7 +10225,7 @@
           <a:p>
             <a:fld id="{6508B24B-3736-46F1-A6CF-41C799FC1BF8}" type="datetime1">
               <a:rPr lang="en-US" smtClean="0"/>
-              <a:t>3/9/2012</a:t>
+              <a:t>3/28/2012</a:t>
             </a:fld>
             <a:endParaRPr lang="en-US"/>
           </a:p>
@@ -10409,7 +10409,7 @@
           <a:p>
             <a:fld id="{737D6933-6F8D-476F-B929-CFD95D14D3FE}" type="datetime1">
               <a:rPr lang="en-US" smtClean="0"/>
-              <a:t>3/9/2012</a:t>
+              <a:t>3/28/2012</a:t>
             </a:fld>
             <a:endParaRPr lang="en-US"/>
           </a:p>
@@ -10589,7 +10589,7 @@
           <a:p>
             <a:fld id="{E3E2306C-E34F-4492-8C03-BFD178B0B86F}" type="datetime1">
               <a:rPr lang="en-US" smtClean="0"/>
-              <a:t>3/9/2012</a:t>
+              <a:t>3/28/2012</a:t>
             </a:fld>
             <a:endParaRPr lang="en-US"/>
           </a:p>
@@ -10839,7 +10839,7 @@
           <a:p>
             <a:fld id="{F45CE621-976D-490D-93D6-82BE04FEF33C}" type="datetime1">
               <a:rPr lang="en-US" smtClean="0"/>
-              <a:t>3/9/2012</a:t>
+              <a:t>3/28/2012</a:t>
             </a:fld>
             <a:endParaRPr lang="en-US"/>
           </a:p>
@@ -11131,7 +11131,7 @@
           <a:p>
             <a:fld id="{24C18882-06AD-4971-A70B-932A9A310951}" type="datetime1">
               <a:rPr lang="en-US" smtClean="0"/>
-              <a:t>3/9/2012</a:t>
+              <a:t>3/28/2012</a:t>
             </a:fld>
             <a:endParaRPr lang="en-US"/>
           </a:p>
@@ -11557,7 +11557,7 @@
           <a:p>
             <a:fld id="{40FDA9CF-AA6A-4460-BD3C-E233BABB6924}" type="datetime1">
               <a:rPr lang="en-US" smtClean="0"/>
-              <a:t>3/9/2012</a:t>
+              <a:t>3/28/2012</a:t>
             </a:fld>
             <a:endParaRPr lang="en-US"/>
           </a:p>
@@ -11679,7 +11679,7 @@
           <a:p>
             <a:fld id="{D9D502B8-AD58-4FD1-B793-29B56CAC21BC}" type="datetime1">
               <a:rPr lang="en-US" smtClean="0"/>
-              <a:t>3/9/2012</a:t>
+              <a:t>3/28/2012</a:t>
             </a:fld>
             <a:endParaRPr lang="en-US"/>
           </a:p>
@@ -11778,7 +11778,7 @@
           <a:p>
             <a:fld id="{B92BDB8E-050F-425D-9DE1-477C1D76FE38}" type="datetime1">
               <a:rPr lang="en-US" smtClean="0"/>
-              <a:t>3/9/2012</a:t>
+              <a:t>3/28/2012</a:t>
             </a:fld>
             <a:endParaRPr lang="en-US"/>
           </a:p>
@@ -12059,7 +12059,7 @@
           <a:p>
             <a:fld id="{4DCF948D-9A0F-45A7-AC2A-0F9D66411295}" type="datetime1">
               <a:rPr lang="en-US" smtClean="0"/>
-              <a:t>3/9/2012</a:t>
+              <a:t>3/28/2012</a:t>
             </a:fld>
             <a:endParaRPr lang="en-US"/>
           </a:p>
@@ -12316,7 +12316,7 @@
           <a:p>
             <a:fld id="{4A21D891-95FB-4F5F-ADE7-5BBBBA77FC22}" type="datetime1">
               <a:rPr lang="en-US" smtClean="0"/>
-              <a:t>3/9/2012</a:t>
+              <a:t>3/28/2012</a:t>
             </a:fld>
             <a:endParaRPr lang="en-US"/>
           </a:p>
@@ -12533,7 +12533,7 @@
           <a:p>
             <a:fld id="{52F776B0-53FF-4CEF-B324-E68B4BDDBC71}" type="datetime1">
               <a:rPr lang="en-US" smtClean="0"/>
-              <a:t>3/9/2012</a:t>
+              <a:t>3/28/2012</a:t>
             </a:fld>
             <a:endParaRPr lang="en-US"/>
           </a:p>
@@ -12931,13 +12931,13 @@
         </p:spPr>
         <p:txBody>
           <a:bodyPr>
-            <a:normAutofit/>
+            <a:normAutofit fontScale="90000"/>
           </a:bodyPr>
           <a:lstStyle/>
           <a:p>
             <a:r>
               <a:rPr lang="en-US" b="1" dirty="0" smtClean="0"/>
-              <a:t>THIẾT KẾ MẠNG CHỊU LỖI</a:t>
+              <a:t>SURVIVALBE NETWORK DESIGN</a:t>
             </a:r>
             <a:endParaRPr lang="en-US" b="1" dirty="0"/>
           </a:p>
@@ -12960,7 +12960,7 @@
           <a:p>
             <a:fld id="{76501CD9-90AD-4FB7-A953-0FB9DCCFDF2E}" type="datetime1">
               <a:rPr lang="en-US" smtClean="0"/>
-              <a:t>3/9/2012</a:t>
+              <a:t>3/28/2012</a:t>
             </a:fld>
             <a:endParaRPr lang="en-US"/>
           </a:p>
@@ -13116,7 +13116,7 @@
           <a:p>
             <a:fld id="{D9D502B8-AD58-4FD1-B793-29B56CAC21BC}" type="datetime1">
               <a:rPr lang="en-US" smtClean="0"/>
-              <a:t>3/9/2012</a:t>
+              <a:t>3/28/2012</a:t>
             </a:fld>
             <a:endParaRPr lang="en-US"/>
           </a:p>
@@ -13340,7 +13340,7 @@
           <a:p>
             <a:fld id="{D9D502B8-AD58-4FD1-B793-29B56CAC21BC}" type="datetime1">
               <a:rPr lang="en-US" smtClean="0"/>
-              <a:t>3/9/2012</a:t>
+              <a:t>3/28/2012</a:t>
             </a:fld>
             <a:endParaRPr lang="en-US"/>
           </a:p>
@@ -14048,7 +14048,7 @@
           <a:p>
             <a:fld id="{D9D502B8-AD58-4FD1-B793-29B56CAC21BC}" type="datetime1">
               <a:rPr lang="en-US" smtClean="0"/>
-              <a:t>3/9/2012</a:t>
+              <a:t>3/28/2012</a:t>
             </a:fld>
             <a:endParaRPr lang="en-US"/>
           </a:p>
@@ -14613,7 +14613,7 @@
           <a:p>
             <a:fld id="{D9D502B8-AD58-4FD1-B793-29B56CAC21BC}" type="datetime1">
               <a:rPr lang="en-US" smtClean="0"/>
-              <a:t>3/9/2012</a:t>
+              <a:t>3/28/2012</a:t>
             </a:fld>
             <a:endParaRPr lang="en-US"/>
           </a:p>
@@ -15066,7 +15066,7 @@
           <a:p>
             <a:fld id="{D9D502B8-AD58-4FD1-B793-29B56CAC21BC}" type="datetime1">
               <a:rPr lang="en-US" smtClean="0"/>
-              <a:t>3/9/2012</a:t>
+              <a:t>3/28/2012</a:t>
             </a:fld>
             <a:endParaRPr lang="en-US"/>
           </a:p>
@@ -15392,7 +15392,7 @@
           <a:p>
             <a:fld id="{D9D502B8-AD58-4FD1-B793-29B56CAC21BC}" type="datetime1">
               <a:rPr lang="en-US" smtClean="0"/>
-              <a:t>3/9/2012</a:t>
+              <a:t>3/28/2012</a:t>
             </a:fld>
             <a:endParaRPr lang="en-US"/>
           </a:p>
@@ -15505,7 +15505,6 @@
               <a:rPr lang="en-US" dirty="0" smtClean="0"/>
               <a:t>GIẢI THUẬT DI TRUYỀN</a:t>
             </a:r>
-            <a:endParaRPr lang="en-US" dirty="0" smtClean="0"/>
           </a:p>
         </p:txBody>
       </p:sp>
@@ -15800,7 +15799,7 @@
           <a:p>
             <a:fld id="{D9D502B8-AD58-4FD1-B793-29B56CAC21BC}" type="datetime1">
               <a:rPr lang="en-US" smtClean="0"/>
-              <a:t>3/9/2012</a:t>
+              <a:t>3/28/2012</a:t>
             </a:fld>
             <a:endParaRPr lang="en-US"/>
           </a:p>
@@ -16161,11 +16160,7 @@
             <a:pPr lvl="1"/>
             <a:r>
               <a:rPr lang="en-US" dirty="0" smtClean="0"/>
-              <a:t>Out </a:t>
-            </a:r>
-            <a:r>
-              <a:rPr lang="en-US" dirty="0" smtClean="0"/>
-              <a:t>: </a:t>
+              <a:t>Out : </a:t>
             </a:r>
           </a:p>
           <a:p>
@@ -16271,7 +16266,7 @@
           <a:p>
             <a:fld id="{D9D502B8-AD58-4FD1-B793-29B56CAC21BC}" type="datetime1">
               <a:rPr lang="en-US" smtClean="0"/>
-              <a:t>3/9/2012</a:t>
+              <a:t>3/28/2012</a:t>
             </a:fld>
             <a:endParaRPr lang="en-US"/>
           </a:p>
@@ -16750,7 +16745,7 @@
           <a:p>
             <a:fld id="{D9D502B8-AD58-4FD1-B793-29B56CAC21BC}" type="datetime1">
               <a:rPr lang="en-US" smtClean="0"/>
-              <a:t>3/9/2012</a:t>
+              <a:t>3/28/2012</a:t>
             </a:fld>
             <a:endParaRPr lang="en-US"/>
           </a:p>
@@ -16879,7 +16874,7 @@
           <a:p>
             <a:r>
               <a:rPr lang="en-US" dirty="0" err="1" smtClean="0"/>
-              <a:t>Tổng</a:t>
+              <a:t>Tổng</a:t>
             </a:r>
             <a:r>
               <a:rPr lang="en-US" dirty="0" smtClean="0"/>
@@ -16895,15 +16890,15 @@
             </a:r>
             <a:r>
               <a:rPr lang="en-US" dirty="0" err="1" smtClean="0"/>
-              <a:t>về</a:t>
-            </a:r>
-            <a:r>
-              <a:rPr lang="en-US" dirty="0" smtClean="0"/>
-              <a:t> </a:t>
-            </a:r>
-            <a:r>
-              <a:rPr lang="en-US" dirty="0" err="1" smtClean="0"/>
-              <a:t>mạng</a:t>
+              <a:t>vê</a:t>
+            </a:r>
+            <a:r>
+              <a:rPr lang="en-US" dirty="0" smtClean="0"/>
+              <a:t>̀ </a:t>
+            </a:r>
+            <a:r>
+              <a:rPr lang="en-US" dirty="0" err="1" smtClean="0"/>
+              <a:t>mạng</a:t>
             </a:r>
             <a:r>
               <a:rPr lang="en-US" dirty="0" smtClean="0"/>
@@ -16918,158 +16913,109 @@
           <a:p>
             <a:r>
               <a:rPr lang="en-US" dirty="0" err="1" smtClean="0"/>
-              <a:t>Ứng</a:t>
-            </a:r>
-            <a:r>
-              <a:rPr lang="en-US" dirty="0" smtClean="0"/>
-              <a:t> </a:t>
-            </a:r>
-            <a:r>
-              <a:rPr lang="en-US" dirty="0" err="1" smtClean="0"/>
-              <a:t>dụng</a:t>
-            </a:r>
-            <a:r>
-              <a:rPr lang="en-US" dirty="0" smtClean="0"/>
-              <a:t> </a:t>
-            </a:r>
-            <a:r>
-              <a:rPr lang="en-US" dirty="0" err="1" smtClean="0"/>
-              <a:t>giải</a:t>
-            </a:r>
-            <a:r>
-              <a:rPr lang="en-US" dirty="0" smtClean="0"/>
-              <a:t> </a:t>
-            </a:r>
-            <a:r>
-              <a:rPr lang="en-US" dirty="0" err="1" smtClean="0"/>
-              <a:t>thuật</a:t>
-            </a:r>
-            <a:r>
-              <a:rPr lang="en-US" dirty="0" smtClean="0"/>
-              <a:t> di </a:t>
-            </a:r>
-            <a:r>
-              <a:rPr lang="en-US" dirty="0" err="1" smtClean="0"/>
-              <a:t>truyền</a:t>
-            </a:r>
-            <a:r>
-              <a:rPr lang="en-US" dirty="0" smtClean="0"/>
-              <a:t> </a:t>
-            </a:r>
-            <a:r>
-              <a:rPr lang="en-US" dirty="0" err="1" smtClean="0"/>
-              <a:t>giải</a:t>
-            </a:r>
-            <a:r>
-              <a:rPr lang="en-US" dirty="0" smtClean="0"/>
-              <a:t> </a:t>
-            </a:r>
-            <a:r>
-              <a:rPr lang="en-US" dirty="0" err="1" smtClean="0"/>
-              <a:t>một</a:t>
-            </a:r>
-            <a:r>
-              <a:rPr lang="en-US" dirty="0" smtClean="0"/>
-              <a:t> </a:t>
-            </a:r>
-            <a:r>
-              <a:rPr lang="en-US" dirty="0" err="1" smtClean="0"/>
-              <a:t>số</a:t>
-            </a:r>
-            <a:r>
-              <a:rPr lang="en-US" dirty="0" smtClean="0"/>
-              <a:t> </a:t>
-            </a:r>
-            <a:r>
-              <a:rPr lang="en-US" dirty="0" err="1" smtClean="0"/>
-              <a:t>bài</a:t>
-            </a:r>
-            <a:r>
-              <a:rPr lang="en-US" dirty="0" smtClean="0"/>
-              <a:t> </a:t>
-            </a:r>
-            <a:r>
-              <a:rPr lang="en-US" dirty="0" err="1" smtClean="0"/>
-              <a:t>toán</a:t>
-            </a:r>
-            <a:r>
-              <a:rPr lang="en-US" dirty="0" smtClean="0"/>
-              <a:t> </a:t>
-            </a:r>
-            <a:r>
-              <a:rPr lang="en-US" dirty="0" err="1" smtClean="0"/>
-              <a:t>trên</a:t>
-            </a:r>
-            <a:r>
-              <a:rPr lang="en-US" dirty="0" smtClean="0"/>
-              <a:t> </a:t>
-            </a:r>
-            <a:r>
-              <a:rPr lang="en-US" dirty="0" err="1" smtClean="0"/>
-              <a:t>đồ</a:t>
-            </a:r>
-            <a:r>
-              <a:rPr lang="en-US" dirty="0" smtClean="0"/>
-              <a:t> </a:t>
-            </a:r>
-            <a:r>
-              <a:rPr lang="en-US" dirty="0" err="1" smtClean="0"/>
-              <a:t>thị</a:t>
+              <a:t>Phát</a:t>
+            </a:r>
+            <a:r>
+              <a:rPr lang="en-US" dirty="0" smtClean="0"/>
+              <a:t> </a:t>
+            </a:r>
+            <a:r>
+              <a:rPr lang="en-US" dirty="0" err="1" smtClean="0"/>
+              <a:t>biểu</a:t>
+            </a:r>
+            <a:r>
+              <a:rPr lang="en-US" dirty="0" smtClean="0"/>
+              <a:t> </a:t>
+            </a:r>
+            <a:r>
+              <a:rPr lang="en-US" dirty="0" err="1" smtClean="0"/>
+              <a:t>bài</a:t>
+            </a:r>
+            <a:r>
+              <a:rPr lang="en-US" dirty="0" smtClean="0"/>
+              <a:t> </a:t>
+            </a:r>
+            <a:r>
+              <a:rPr lang="en-US" dirty="0" err="1" smtClean="0"/>
+              <a:t>toán</a:t>
             </a:r>
             <a:endParaRPr lang="en-US" dirty="0" smtClean="0"/>
           </a:p>
           <a:p>
             <a:r>
               <a:rPr lang="en-US" dirty="0" err="1" smtClean="0"/>
-              <a:t>Bài</a:t>
-            </a:r>
-            <a:r>
-              <a:rPr lang="en-US" dirty="0" smtClean="0"/>
-              <a:t> </a:t>
-            </a:r>
-            <a:r>
-              <a:rPr lang="en-US" dirty="0" err="1" smtClean="0"/>
-              <a:t>toán</a:t>
-            </a:r>
-            <a:r>
-              <a:rPr lang="en-US" dirty="0" smtClean="0"/>
-              <a:t> </a:t>
-            </a:r>
-            <a:r>
-              <a:rPr lang="en-US" dirty="0" err="1" smtClean="0"/>
-              <a:t>thiết</a:t>
-            </a:r>
-            <a:r>
-              <a:rPr lang="en-US" dirty="0" smtClean="0"/>
-              <a:t> </a:t>
-            </a:r>
-            <a:r>
-              <a:rPr lang="en-US" dirty="0" err="1" smtClean="0"/>
-              <a:t>kế</a:t>
-            </a:r>
-            <a:r>
-              <a:rPr lang="en-US" dirty="0" smtClean="0"/>
-              <a:t> </a:t>
-            </a:r>
-            <a:r>
-              <a:rPr lang="en-US" dirty="0" err="1" smtClean="0"/>
-              <a:t>mạng</a:t>
-            </a:r>
-            <a:r>
-              <a:rPr lang="en-US" dirty="0" smtClean="0"/>
-              <a:t> </a:t>
-            </a:r>
-            <a:r>
-              <a:rPr lang="en-US" dirty="0" err="1" smtClean="0"/>
-              <a:t>chịu</a:t>
-            </a:r>
-            <a:r>
-              <a:rPr lang="en-US" dirty="0" smtClean="0"/>
-              <a:t> </a:t>
-            </a:r>
-            <a:r>
-              <a:rPr lang="en-US" dirty="0" err="1" smtClean="0"/>
-              <a:t>lỗi</a:t>
+              <a:t>Các</a:t>
+            </a:r>
+            <a:r>
+              <a:rPr lang="en-US" dirty="0" smtClean="0"/>
+              <a:t> </a:t>
+            </a:r>
+            <a:r>
+              <a:rPr lang="en-US" dirty="0" err="1" smtClean="0"/>
+              <a:t>nghiên</a:t>
+            </a:r>
+            <a:r>
+              <a:rPr lang="en-US" dirty="0" smtClean="0"/>
+              <a:t> </a:t>
+            </a:r>
+            <a:r>
+              <a:rPr lang="en-US" dirty="0" err="1" smtClean="0"/>
+              <a:t>cứu</a:t>
+            </a:r>
+            <a:r>
+              <a:rPr lang="en-US" dirty="0" smtClean="0"/>
+              <a:t> </a:t>
+            </a:r>
+            <a:r>
+              <a:rPr lang="en-US" dirty="0" err="1" smtClean="0"/>
+              <a:t>liên</a:t>
+            </a:r>
+            <a:r>
+              <a:rPr lang="en-US" dirty="0" smtClean="0"/>
+              <a:t> </a:t>
+            </a:r>
+            <a:r>
+              <a:rPr lang="en-US" dirty="0" err="1" smtClean="0"/>
+              <a:t>quan</a:t>
+            </a:r>
+            <a:endParaRPr lang="en-US" dirty="0" smtClean="0"/>
+          </a:p>
+          <a:p>
+            <a:r>
+              <a:rPr lang="en-US" dirty="0" err="1" smtClean="0"/>
+              <a:t>Hướng</a:t>
+            </a:r>
+            <a:r>
+              <a:rPr lang="en-US" dirty="0" smtClean="0"/>
+              <a:t> </a:t>
+            </a:r>
+            <a:r>
+              <a:rPr lang="en-US" dirty="0" err="1" smtClean="0"/>
+              <a:t>nghiên</a:t>
+            </a:r>
+            <a:r>
+              <a:rPr lang="en-US" dirty="0" smtClean="0"/>
+              <a:t> </a:t>
+            </a:r>
+            <a:r>
+              <a:rPr lang="en-US" dirty="0" err="1" smtClean="0"/>
+              <a:t>cứu</a:t>
+            </a:r>
+            <a:r>
+              <a:rPr lang="en-US" dirty="0" smtClean="0"/>
+              <a:t> </a:t>
+            </a:r>
+            <a:r>
+              <a:rPr lang="en-US" dirty="0" err="1" smtClean="0"/>
+              <a:t>của</a:t>
+            </a:r>
+            <a:r>
+              <a:rPr lang="en-US" dirty="0" smtClean="0"/>
+              <a:t> </a:t>
+            </a:r>
+            <a:r>
+              <a:rPr lang="en-US" smtClean="0"/>
+              <a:t>nhóm</a:t>
             </a:r>
             <a:endParaRPr lang="en-US" dirty="0" smtClean="0"/>
           </a:p>
@@ -17095,7 +17041,7 @@
           <a:p>
             <a:fld id="{D9D502B8-AD58-4FD1-B793-29B56CAC21BC}" type="datetime1">
               <a:rPr lang="en-US" smtClean="0"/>
-              <a:t>3/9/2012</a:t>
+              <a:t>3/28/2012</a:t>
             </a:fld>
             <a:endParaRPr lang="en-US"/>
           </a:p>
@@ -17524,7 +17470,7 @@
           <a:p>
             <a:fld id="{D9D502B8-AD58-4FD1-B793-29B56CAC21BC}" type="datetime1">
               <a:rPr lang="en-US" smtClean="0"/>
-              <a:t>3/9/2012</a:t>
+              <a:t>3/28/2012</a:t>
             </a:fld>
             <a:endParaRPr lang="en-US"/>
           </a:p>
@@ -17970,7 +17916,7 @@
           <a:p>
             <a:fld id="{D9D502B8-AD58-4FD1-B793-29B56CAC21BC}" type="datetime1">
               <a:rPr lang="en-US" smtClean="0"/>
-              <a:t>3/9/2012</a:t>
+              <a:t>3/28/2012</a:t>
             </a:fld>
             <a:endParaRPr lang="en-US"/>
           </a:p>
@@ -18209,7 +18155,7 @@
           <a:p>
             <a:fld id="{D9D502B8-AD58-4FD1-B793-29B56CAC21BC}" type="datetime1">
               <a:rPr lang="en-US" smtClean="0"/>
-              <a:t>3/9/2012</a:t>
+              <a:t>3/28/2012</a:t>
             </a:fld>
             <a:endParaRPr lang="en-US"/>
           </a:p>
@@ -20752,7 +20698,7 @@
           <a:p>
             <a:fld id="{D9D502B8-AD58-4FD1-B793-29B56CAC21BC}" type="datetime1">
               <a:rPr lang="en-US" smtClean="0"/>
-              <a:t>3/9/2012</a:t>
+              <a:t>3/28/2012</a:t>
             </a:fld>
             <a:endParaRPr lang="en-US"/>
           </a:p>
@@ -21290,7 +21236,7 @@
           <a:p>
             <a:fld id="{D9D502B8-AD58-4FD1-B793-29B56CAC21BC}" type="datetime1">
               <a:rPr lang="en-US" smtClean="0"/>
-              <a:t>3/9/2012</a:t>
+              <a:t>3/28/2012</a:t>
             </a:fld>
             <a:endParaRPr lang="en-US"/>
           </a:p>
@@ -21494,7 +21440,6 @@
               <a:rPr lang="en-US" dirty="0" smtClean="0"/>
               <a:t>)</a:t>
             </a:r>
-            <a:endParaRPr lang="en-US" dirty="0" smtClean="0"/>
           </a:p>
           <a:p>
             <a:pPr lvl="1"/>
@@ -21728,7 +21673,7 @@
           <a:p>
             <a:fld id="{D9D502B8-AD58-4FD1-B793-29B56CAC21BC}" type="datetime1">
               <a:rPr lang="en-US" smtClean="0"/>
-              <a:t>3/9/2012</a:t>
+              <a:t>3/28/2012</a:t>
             </a:fld>
             <a:endParaRPr lang="en-US"/>
           </a:p>
@@ -22143,7 +22088,7 @@
           <a:p>
             <a:fld id="{D9D502B8-AD58-4FD1-B793-29B56CAC21BC}" type="datetime1">
               <a:rPr lang="en-US" smtClean="0"/>
-              <a:t>3/9/2012</a:t>
+              <a:t>3/28/2012</a:t>
             </a:fld>
             <a:endParaRPr lang="en-US"/>
           </a:p>
@@ -22255,8 +22200,8 @@
           </a:p>
         </p:txBody>
       </p:sp>
-      <mc:AlternateContent xmlns:mc="http://schemas.openxmlformats.org/markup-compatibility/2006">
-        <mc:Choice xmlns:a14="http://schemas.microsoft.com/office/drawing/2010/main" Requires="a14">
+      <mc:AlternateContent xmlns:mc="http://schemas.openxmlformats.org/markup-compatibility/2006" xmlns:a14="http://schemas.microsoft.com/office/drawing/2010/main">
+        <mc:Choice Requires="a14">
           <p:sp>
             <p:nvSpPr>
               <p:cNvPr id="7" name="Content Placeholder 6"/>
@@ -23043,7 +22988,7 @@
             </p:txBody>
           </p:sp>
         </mc:Choice>
-        <mc:Fallback>
+        <mc:Fallback xmlns="">
           <p:sp>
             <p:nvSpPr>
               <p:cNvPr id="7" name="Content Placeholder 6"/>
@@ -23094,7 +23039,7 @@
           <a:p>
             <a:fld id="{D9D502B8-AD58-4FD1-B793-29B56CAC21BC}" type="datetime1">
               <a:rPr lang="en-US" smtClean="0"/>
-              <a:t>3/9/2012</a:t>
+              <a:t>3/28/2012</a:t>
             </a:fld>
             <a:endParaRPr lang="en-US"/>
           </a:p>
@@ -23383,7 +23328,7 @@
           <a:p>
             <a:fld id="{D9D502B8-AD58-4FD1-B793-29B56CAC21BC}" type="datetime1">
               <a:rPr lang="en-US" smtClean="0"/>
-              <a:t>3/9/2012</a:t>
+              <a:t>3/28/2012</a:t>
             </a:fld>
             <a:endParaRPr lang="en-US"/>
           </a:p>
@@ -23515,11 +23460,7 @@
           <a:p>
             <a:r>
               <a:rPr lang="en-US" dirty="0" smtClean="0"/>
-              <a:t>Survivable Mapping Algorithm by Ring Trimming ( SMART ) for large IP-over- WDM </a:t>
-            </a:r>
-            <a:r>
-              <a:rPr lang="en-US" dirty="0" smtClean="0"/>
-              <a:t>networks</a:t>
+              <a:t>Survivable Mapping Algorithm by Ring Trimming ( SMART ) for large IP-over- WDM networks</a:t>
             </a:r>
           </a:p>
           <a:p>
@@ -23646,7 +23587,7 @@
           <a:p>
             <a:fld id="{D9D502B8-AD58-4FD1-B793-29B56CAC21BC}" type="datetime1">
               <a:rPr lang="en-US" smtClean="0"/>
-              <a:t>3/9/2012</a:t>
+              <a:t>3/28/2012</a:t>
             </a:fld>
             <a:endParaRPr lang="en-US"/>
           </a:p>
@@ -23957,7 +23898,7 @@
           <a:p>
             <a:fld id="{E3E2306C-E34F-4492-8C03-BFD178B0B86F}" type="datetime1">
               <a:rPr lang="en-US" smtClean="0"/>
-              <a:t>3/9/2012</a:t>
+              <a:t>3/28/2012</a:t>
             </a:fld>
             <a:endParaRPr lang="en-US"/>
           </a:p>
@@ -24636,7 +24577,7 @@
           <a:p>
             <a:fld id="{D9D502B8-AD58-4FD1-B793-29B56CAC21BC}" type="datetime1">
               <a:rPr lang="en-US" smtClean="0"/>
-              <a:t>3/9/2012</a:t>
+              <a:t>3/28/2012</a:t>
             </a:fld>
             <a:endParaRPr lang="en-US"/>
           </a:p>
@@ -24985,7 +24926,7 @@
           <a:p>
             <a:fld id="{D9D502B8-AD58-4FD1-B793-29B56CAC21BC}" type="datetime1">
               <a:rPr lang="en-US" smtClean="0"/>
-              <a:t>3/9/2012</a:t>
+              <a:t>3/28/2012</a:t>
             </a:fld>
             <a:endParaRPr lang="en-US"/>
           </a:p>
@@ -25312,7 +25253,7 @@
           <a:p>
             <a:fld id="{D9D502B8-AD58-4FD1-B793-29B56CAC21BC}" type="datetime1">
               <a:rPr lang="en-US" smtClean="0"/>
-              <a:t>3/9/2012</a:t>
+              <a:t>3/28/2012</a:t>
             </a:fld>
             <a:endParaRPr lang="en-US"/>
           </a:p>
@@ -25448,7 +25389,7 @@
           <a:p>
             <a:fld id="{E3E2306C-E34F-4492-8C03-BFD178B0B86F}" type="datetime1">
               <a:rPr lang="en-US" smtClean="0"/>
-              <a:t>3/9/2012</a:t>
+              <a:t>3/28/2012</a:t>
             </a:fld>
             <a:endParaRPr lang="en-US"/>
           </a:p>
@@ -25632,7 +25573,7 @@
           <a:p>
             <a:fld id="{D9D502B8-AD58-4FD1-B793-29B56CAC21BC}" type="datetime1">
               <a:rPr lang="en-US" smtClean="0"/>
-              <a:t>3/9/2012</a:t>
+              <a:t>3/28/2012</a:t>
             </a:fld>
             <a:endParaRPr lang="en-US"/>
           </a:p>
@@ -25833,7 +25774,7 @@
           <a:p>
             <a:fld id="{D9D502B8-AD58-4FD1-B793-29B56CAC21BC}" type="datetime1">
               <a:rPr lang="en-US" smtClean="0"/>
-              <a:t>3/9/2012</a:t>
+              <a:t>3/28/2012</a:t>
             </a:fld>
             <a:endParaRPr lang="en-US"/>
           </a:p>
@@ -26137,7 +26078,7 @@
           <a:p>
             <a:fld id="{D9D502B8-AD58-4FD1-B793-29B56CAC21BC}" type="datetime1">
               <a:rPr lang="en-US" smtClean="0"/>
-              <a:t>3/9/2012</a:t>
+              <a:t>3/28/2012</a:t>
             </a:fld>
             <a:endParaRPr lang="en-US"/>
           </a:p>
@@ -26381,7 +26322,7 @@
           <a:p>
             <a:fld id="{D9D502B8-AD58-4FD1-B793-29B56CAC21BC}" type="datetime1">
               <a:rPr lang="en-US" smtClean="0"/>
-              <a:t>3/9/2012</a:t>
+              <a:t>3/28/2012</a:t>
             </a:fld>
             <a:endParaRPr lang="en-US"/>
           </a:p>
@@ -26613,7 +26554,7 @@
           <a:p>
             <a:fld id="{D9D502B8-AD58-4FD1-B793-29B56CAC21BC}" type="datetime1">
               <a:rPr lang="en-US" smtClean="0"/>
-              <a:t>3/9/2012</a:t>
+              <a:t>3/28/2012</a:t>
             </a:fld>
             <a:endParaRPr lang="en-US"/>
           </a:p>
@@ -26879,7 +26820,7 @@
           <a:p>
             <a:fld id="{D9D502B8-AD58-4FD1-B793-29B56CAC21BC}" type="datetime1">
               <a:rPr lang="en-US" smtClean="0"/>
-              <a:t>3/9/2012</a:t>
+              <a:t>3/28/2012</a:t>
             </a:fld>
             <a:endParaRPr lang="en-US"/>
           </a:p>
@@ -26956,7 +26897,7 @@
   <a:themeElements>
     <a:clrScheme name="Office">
       <a:dk1>
-        <a:sysClr val="windowText" lastClr="535353"/>
+        <a:sysClr val="windowText" lastClr="000000"/>
       </a:dk1>
       <a:lt1>
         <a:sysClr val="window" lastClr="FFFFFF"/>
@@ -27241,7 +27182,7 @@
   <a:themeElements>
     <a:clrScheme name="Office">
       <a:dk1>
-        <a:sysClr val="windowText" lastClr="535353"/>
+        <a:sysClr val="windowText" lastClr="000000"/>
       </a:dk1>
       <a:lt1>
         <a:sysClr val="window" lastClr="FFFFFF"/>

</xml_diff>